<commit_message>
pp changes and examples from faanes
</commit_message>
<xml_diff>
--- a/presentation/elementMethod_EXAM_PP.pptx
+++ b/presentation/elementMethod_EXAM_PP.pptx
@@ -267,7 +267,7 @@
           <a:p>
             <a:fld id="{F4CD86A1-9B72-4040-9535-F1A9B0053CB3}" type="datetimeFigureOut">
               <a:rPr lang="nb-NO" smtClean="0"/>
-              <a:t>15.02.2024</a:t>
+              <a:t>21.02.2024</a:t>
             </a:fld>
             <a:endParaRPr lang="nb-NO" dirty="0"/>
           </a:p>
@@ -465,7 +465,7 @@
           <a:p>
             <a:fld id="{F4CD86A1-9B72-4040-9535-F1A9B0053CB3}" type="datetimeFigureOut">
               <a:rPr lang="nb-NO" smtClean="0"/>
-              <a:t>15.02.2024</a:t>
+              <a:t>21.02.2024</a:t>
             </a:fld>
             <a:endParaRPr lang="nb-NO"/>
           </a:p>
@@ -673,7 +673,7 @@
           <a:p>
             <a:fld id="{F4CD86A1-9B72-4040-9535-F1A9B0053CB3}" type="datetimeFigureOut">
               <a:rPr lang="nb-NO" smtClean="0"/>
-              <a:t>15.02.2024</a:t>
+              <a:t>21.02.2024</a:t>
             </a:fld>
             <a:endParaRPr lang="nb-NO"/>
           </a:p>
@@ -871,7 +871,7 @@
           <a:p>
             <a:fld id="{F4CD86A1-9B72-4040-9535-F1A9B0053CB3}" type="datetimeFigureOut">
               <a:rPr lang="nb-NO" smtClean="0"/>
-              <a:t>15.02.2024</a:t>
+              <a:t>21.02.2024</a:t>
             </a:fld>
             <a:endParaRPr lang="nb-NO"/>
           </a:p>
@@ -1146,7 +1146,7 @@
           <a:p>
             <a:fld id="{F4CD86A1-9B72-4040-9535-F1A9B0053CB3}" type="datetimeFigureOut">
               <a:rPr lang="nb-NO" smtClean="0"/>
-              <a:t>15.02.2024</a:t>
+              <a:t>21.02.2024</a:t>
             </a:fld>
             <a:endParaRPr lang="nb-NO"/>
           </a:p>
@@ -1411,7 +1411,7 @@
           <a:p>
             <a:fld id="{F4CD86A1-9B72-4040-9535-F1A9B0053CB3}" type="datetimeFigureOut">
               <a:rPr lang="nb-NO" smtClean="0"/>
-              <a:t>15.02.2024</a:t>
+              <a:t>21.02.2024</a:t>
             </a:fld>
             <a:endParaRPr lang="nb-NO"/>
           </a:p>
@@ -1823,7 +1823,7 @@
           <a:p>
             <a:fld id="{F4CD86A1-9B72-4040-9535-F1A9B0053CB3}" type="datetimeFigureOut">
               <a:rPr lang="nb-NO" smtClean="0"/>
-              <a:t>15.02.2024</a:t>
+              <a:t>21.02.2024</a:t>
             </a:fld>
             <a:endParaRPr lang="nb-NO"/>
           </a:p>
@@ -1964,7 +1964,7 @@
           <a:p>
             <a:fld id="{F4CD86A1-9B72-4040-9535-F1A9B0053CB3}" type="datetimeFigureOut">
               <a:rPr lang="nb-NO" smtClean="0"/>
-              <a:t>15.02.2024</a:t>
+              <a:t>21.02.2024</a:t>
             </a:fld>
             <a:endParaRPr lang="nb-NO"/>
           </a:p>
@@ -2077,7 +2077,7 @@
           <a:p>
             <a:fld id="{F4CD86A1-9B72-4040-9535-F1A9B0053CB3}" type="datetimeFigureOut">
               <a:rPr lang="nb-NO" smtClean="0"/>
-              <a:t>15.02.2024</a:t>
+              <a:t>21.02.2024</a:t>
             </a:fld>
             <a:endParaRPr lang="nb-NO"/>
           </a:p>
@@ -2388,7 +2388,7 @@
           <a:p>
             <a:fld id="{F4CD86A1-9B72-4040-9535-F1A9B0053CB3}" type="datetimeFigureOut">
               <a:rPr lang="nb-NO" smtClean="0"/>
-              <a:t>15.02.2024</a:t>
+              <a:t>21.02.2024</a:t>
             </a:fld>
             <a:endParaRPr lang="nb-NO"/>
           </a:p>
@@ -2676,7 +2676,7 @@
           <a:p>
             <a:fld id="{F4CD86A1-9B72-4040-9535-F1A9B0053CB3}" type="datetimeFigureOut">
               <a:rPr lang="nb-NO" smtClean="0"/>
-              <a:t>15.02.2024</a:t>
+              <a:t>21.02.2024</a:t>
             </a:fld>
             <a:endParaRPr lang="nb-NO"/>
           </a:p>
@@ -2920,7 +2920,7 @@
           <a:p>
             <a:fld id="{F4CD86A1-9B72-4040-9535-F1A9B0053CB3}" type="datetimeFigureOut">
               <a:rPr lang="nb-NO" smtClean="0"/>
-              <a:t>15.02.2024</a:t>
+              <a:t>21.02.2024</a:t>
             </a:fld>
             <a:endParaRPr lang="nb-NO"/>
           </a:p>
@@ -3754,17 +3754,8 @@
           <a:p>
             <a:r>
               <a:rPr lang="nb-NO" dirty="0"/>
-              <a:t>Sigrid sin case </a:t>
-            </a:r>
-            <a:r>
-              <a:rPr lang="nb-NO" dirty="0" err="1"/>
-              <a:t>nr</a:t>
-            </a:r>
-            <a:r>
-              <a:rPr lang="nb-NO"/>
-              <a:t> 5</a:t>
-            </a:r>
-            <a:endParaRPr lang="nb-NO" dirty="0"/>
+              <a:t>Sigrid sin case nr 5</a:t>
+            </a:r>
           </a:p>
         </p:txBody>
       </p:sp>
@@ -3836,21 +3827,7 @@
                 <a:latin typeface="Inter Soft Semibold" pitchFamily="2" charset="0"/>
                 <a:ea typeface="Inter Soft Semibold" pitchFamily="2" charset="0"/>
               </a:rPr>
-              <a:t>Analysis </a:t>
-            </a:r>
-            <a:r>
-              <a:rPr lang="nb-NO" dirty="0" err="1">
-                <a:latin typeface="Inter Soft Semibold" pitchFamily="2" charset="0"/>
-                <a:ea typeface="Inter Soft Semibold" pitchFamily="2" charset="0"/>
-              </a:rPr>
-              <a:t>of</a:t>
-            </a:r>
-            <a:r>
-              <a:rPr lang="nb-NO" dirty="0">
-                <a:latin typeface="Inter Soft Semibold" pitchFamily="2" charset="0"/>
-                <a:ea typeface="Inter Soft Semibold" pitchFamily="2" charset="0"/>
-              </a:rPr>
-              <a:t> </a:t>
+              <a:t>Analysis of </a:t>
             </a:r>
             <a:br>
               <a:rPr lang="nb-NO" dirty="0">
@@ -3876,7 +3853,7 @@
               <a:t> and </a:t>
             </a:r>
             <a:r>
-              <a:rPr lang="nb-NO" dirty="0" err="1">
+              <a:rPr lang="nb-NO" dirty="0">
                 <a:solidFill>
                   <a:srgbClr val="009C94"/>
                 </a:solidFill>
@@ -3890,112 +3867,53 @@
                 <a:latin typeface="Inter Soft Semibold" pitchFamily="2" charset="0"/>
                 <a:ea typeface="Inter Soft Semibold" pitchFamily="2" charset="0"/>
               </a:rPr>
-              <a:t> </a:t>
-            </a:r>
-            <a:r>
-              <a:rPr lang="nb-NO" dirty="0" err="1">
+              <a:t> load on a </a:t>
+            </a:r>
+            <a:br>
+              <a:rPr lang="nb-NO" dirty="0">
+                <a:solidFill>
+                  <a:srgbClr val="009C94"/>
+                </a:solidFill>
                 <a:latin typeface="Inter Soft Semibold" pitchFamily="2" charset="0"/>
                 <a:ea typeface="Inter Soft Semibold" pitchFamily="2" charset="0"/>
               </a:rPr>
-              <a:t>load</a:t>
-            </a:r>
+            </a:br>
+            <a:r>
+              <a:rPr lang="nb-NO" strike="sngStrike" dirty="0">
+                <a:solidFill>
+                  <a:srgbClr val="009C94"/>
+                </a:solidFill>
+                <a:latin typeface="Inter Soft Semibold" pitchFamily="2" charset="0"/>
+                <a:ea typeface="Inter Soft Semibold" pitchFamily="2" charset="0"/>
+              </a:rPr>
+              <a:t>plate</a:t>
+            </a:r>
+            <a:r>
+              <a:rPr lang="nb-NO" dirty="0">
+                <a:solidFill>
+                  <a:srgbClr val="009C94"/>
+                </a:solidFill>
+                <a:latin typeface="Inter Soft Semibold" pitchFamily="2" charset="0"/>
+                <a:ea typeface="Inter Soft Semibold" pitchFamily="2" charset="0"/>
+              </a:rPr>
+              <a:t> shell of aluminum</a:t>
+            </a:r>
+            <a:br>
+              <a:rPr lang="nb-NO" dirty="0">
+                <a:solidFill>
+                  <a:srgbClr val="009C94"/>
+                </a:solidFill>
+                <a:latin typeface="Inter Soft Semibold" pitchFamily="2" charset="0"/>
+                <a:ea typeface="Inter Soft Semibold" pitchFamily="2" charset="0"/>
+              </a:rPr>
+            </a:br>
             <a:r>
               <a:rPr lang="nb-NO" dirty="0">
                 <a:latin typeface="Inter Soft Semibold" pitchFamily="2" charset="0"/>
                 <a:ea typeface="Inter Soft Semibold" pitchFamily="2" charset="0"/>
               </a:rPr>
-              <a:t> </a:t>
-            </a:r>
-            <a:r>
-              <a:rPr lang="nb-NO" dirty="0" err="1">
-                <a:latin typeface="Inter Soft Semibold" pitchFamily="2" charset="0"/>
-                <a:ea typeface="Inter Soft Semibold" pitchFamily="2" charset="0"/>
-              </a:rPr>
-              <a:t>on</a:t>
-            </a:r>
-            <a:r>
-              <a:rPr lang="nb-NO" dirty="0">
-                <a:latin typeface="Inter Soft Semibold" pitchFamily="2" charset="0"/>
-                <a:ea typeface="Inter Soft Semibold" pitchFamily="2" charset="0"/>
-              </a:rPr>
-              <a:t> a </a:t>
-            </a:r>
-            <a:br>
-              <a:rPr lang="nb-NO" dirty="0">
-                <a:solidFill>
-                  <a:srgbClr val="009C94"/>
-                </a:solidFill>
-                <a:latin typeface="Inter Soft Semibold" pitchFamily="2" charset="0"/>
-                <a:ea typeface="Inter Soft Semibold" pitchFamily="2" charset="0"/>
-              </a:rPr>
-            </a:br>
-            <a:r>
-              <a:rPr lang="nb-NO" dirty="0">
-                <a:solidFill>
-                  <a:srgbClr val="009C94"/>
-                </a:solidFill>
-                <a:latin typeface="Inter Soft Semibold" pitchFamily="2" charset="0"/>
-                <a:ea typeface="Inter Soft Semibold" pitchFamily="2" charset="0"/>
-              </a:rPr>
-              <a:t>plate </a:t>
-            </a:r>
-            <a:r>
-              <a:rPr lang="nb-NO" dirty="0" err="1">
-                <a:solidFill>
-                  <a:srgbClr val="009C94"/>
-                </a:solidFill>
-                <a:latin typeface="Inter Soft Semibold" pitchFamily="2" charset="0"/>
-                <a:ea typeface="Inter Soft Semibold" pitchFamily="2" charset="0"/>
-              </a:rPr>
-              <a:t>of</a:t>
-            </a:r>
-            <a:r>
-              <a:rPr lang="nb-NO" dirty="0">
-                <a:solidFill>
-                  <a:srgbClr val="009C94"/>
-                </a:solidFill>
-                <a:latin typeface="Inter Soft Semibold" pitchFamily="2" charset="0"/>
-                <a:ea typeface="Inter Soft Semibold" pitchFamily="2" charset="0"/>
-              </a:rPr>
-              <a:t> </a:t>
-            </a:r>
-            <a:r>
-              <a:rPr lang="nb-NO" dirty="0" err="1">
-                <a:solidFill>
-                  <a:srgbClr val="009C94"/>
-                </a:solidFill>
-                <a:latin typeface="Inter Soft Semibold" pitchFamily="2" charset="0"/>
-                <a:ea typeface="Inter Soft Semibold" pitchFamily="2" charset="0"/>
-              </a:rPr>
-              <a:t>aluminum</a:t>
-            </a:r>
-            <a:br>
-              <a:rPr lang="nb-NO" dirty="0">
-                <a:solidFill>
-                  <a:srgbClr val="009C94"/>
-                </a:solidFill>
-                <a:latin typeface="Inter Soft Semibold" pitchFamily="2" charset="0"/>
-                <a:ea typeface="Inter Soft Semibold" pitchFamily="2" charset="0"/>
-              </a:rPr>
-            </a:br>
-            <a:r>
-              <a:rPr lang="nb-NO" dirty="0">
-                <a:latin typeface="Inter Soft Semibold" pitchFamily="2" charset="0"/>
-                <a:ea typeface="Inter Soft Semibold" pitchFamily="2" charset="0"/>
-              </a:rPr>
-              <a:t>in </a:t>
-            </a:r>
-            <a:r>
-              <a:rPr lang="nb-NO" dirty="0" err="1">
-                <a:latin typeface="Inter Soft Semibold" pitchFamily="2" charset="0"/>
-                <a:ea typeface="Inter Soft Semibold" pitchFamily="2" charset="0"/>
-              </a:rPr>
-              <a:t>Abaqus</a:t>
-            </a:r>
-            <a:endParaRPr lang="nb-NO" dirty="0">
-              <a:latin typeface="Inter Soft Semibold" pitchFamily="2" charset="0"/>
-              <a:ea typeface="Inter Soft Semibold" pitchFamily="2" charset="0"/>
-            </a:endParaRPr>
+              <a:t>in Abaqus</a:t>
+            </a:r>
           </a:p>
         </p:txBody>
       </p:sp>
@@ -4980,77 +4898,21 @@
                 <a:latin typeface="Inter Soft Semibold" pitchFamily="2" charset="0"/>
                 <a:ea typeface="Inter Soft Semibold" pitchFamily="2" charset="0"/>
               </a:rPr>
-              <a:t>How </a:t>
-            </a:r>
-            <a:r>
-              <a:rPr lang="nb-NO" dirty="0" err="1">
+              <a:t>How much force can a </a:t>
+            </a:r>
+            <a:r>
+              <a:rPr lang="nb-NO" strike="sngStrike" dirty="0">
                 <a:latin typeface="Inter Soft Semibold" pitchFamily="2" charset="0"/>
                 <a:ea typeface="Inter Soft Semibold" pitchFamily="2" charset="0"/>
               </a:rPr>
-              <a:t>much</a:t>
+              <a:t>plate</a:t>
             </a:r>
             <a:r>
               <a:rPr lang="nb-NO" dirty="0">
                 <a:latin typeface="Inter Soft Semibold" pitchFamily="2" charset="0"/>
                 <a:ea typeface="Inter Soft Semibold" pitchFamily="2" charset="0"/>
               </a:rPr>
-              <a:t> force </a:t>
-            </a:r>
-            <a:r>
-              <a:rPr lang="nb-NO" dirty="0" err="1">
-                <a:latin typeface="Inter Soft Semibold" pitchFamily="2" charset="0"/>
-                <a:ea typeface="Inter Soft Semibold" pitchFamily="2" charset="0"/>
-              </a:rPr>
-              <a:t>can</a:t>
-            </a:r>
-            <a:r>
-              <a:rPr lang="nb-NO" dirty="0">
-                <a:latin typeface="Inter Soft Semibold" pitchFamily="2" charset="0"/>
-                <a:ea typeface="Inter Soft Semibold" pitchFamily="2" charset="0"/>
-              </a:rPr>
-              <a:t> a plate </a:t>
-            </a:r>
-            <a:r>
-              <a:rPr lang="nb-NO" dirty="0" err="1">
-                <a:latin typeface="Inter Soft Semibold" pitchFamily="2" charset="0"/>
-                <a:ea typeface="Inter Soft Semibold" pitchFamily="2" charset="0"/>
-              </a:rPr>
-              <a:t>of</a:t>
-            </a:r>
-            <a:r>
-              <a:rPr lang="nb-NO" dirty="0">
-                <a:latin typeface="Inter Soft Semibold" pitchFamily="2" charset="0"/>
-                <a:ea typeface="Inter Soft Semibold" pitchFamily="2" charset="0"/>
-              </a:rPr>
-              <a:t> </a:t>
-            </a:r>
-            <a:r>
-              <a:rPr lang="nb-NO" dirty="0" err="1">
-                <a:latin typeface="Inter Soft Semibold" pitchFamily="2" charset="0"/>
-                <a:ea typeface="Inter Soft Semibold" pitchFamily="2" charset="0"/>
-              </a:rPr>
-              <a:t>aluminum</a:t>
-            </a:r>
-            <a:r>
-              <a:rPr lang="nb-NO" dirty="0">
-                <a:latin typeface="Inter Soft Semibold" pitchFamily="2" charset="0"/>
-                <a:ea typeface="Inter Soft Semibold" pitchFamily="2" charset="0"/>
-              </a:rPr>
-              <a:t> </a:t>
-            </a:r>
-            <a:r>
-              <a:rPr lang="nb-NO" dirty="0" err="1">
-                <a:latin typeface="Inter Soft Semibold" pitchFamily="2" charset="0"/>
-                <a:ea typeface="Inter Soft Semibold" pitchFamily="2" charset="0"/>
-              </a:rPr>
-              <a:t>withstand</a:t>
-            </a:r>
-            <a:r>
-              <a:rPr lang="nb-NO" dirty="0">
-                <a:latin typeface="Inter Soft Semibold" pitchFamily="2" charset="0"/>
-                <a:ea typeface="Inter Soft Semibold" pitchFamily="2" charset="0"/>
-              </a:rPr>
-              <a:t>?</a:t>
+              <a:t> shell of aluminum withstand?</a:t>
             </a:r>
           </a:p>
           <a:p>
@@ -5613,7 +5475,7 @@
         </p:blipFill>
         <p:spPr>
           <a:xfrm>
-            <a:off x="10489095" y="575183"/>
+            <a:off x="10199571" y="542180"/>
             <a:ext cx="1003853" cy="2418774"/>
           </a:xfrm>
           <a:prstGeom prst="rect">
@@ -5846,6 +5708,76 @@
           </a:p>
         </p:txBody>
       </p:sp>
+      <p:pic>
+        <p:nvPicPr>
+          <p:cNvPr id="3" name="Grafikk 17">
+            <a:extLst>
+              <a:ext uri="{FF2B5EF4-FFF2-40B4-BE49-F238E27FC236}">
+                <a16:creationId xmlns:a16="http://schemas.microsoft.com/office/drawing/2014/main" id="{62355B6A-EC4F-55EB-2303-C7822214CD36}"/>
+              </a:ext>
+            </a:extLst>
+          </p:cNvPr>
+          <p:cNvPicPr>
+            <a:picLocks noChangeAspect="1"/>
+          </p:cNvPicPr>
+          <p:nvPr/>
+        </p:nvPicPr>
+        <p:blipFill rotWithShape="1">
+          <a:blip r:embed="rId4">
+            <a:extLst>
+              <a:ext uri="{96DAC541-7B7A-43D3-8B79-37D633B846F1}">
+                <asvg:svgBlip xmlns:asvg="http://schemas.microsoft.com/office/drawing/2016/SVG/main" r:embed="rId5"/>
+              </a:ext>
+            </a:extLst>
+          </a:blip>
+          <a:srcRect l="21012" t="-1" r="49514" b="-7242"/>
+          <a:stretch/>
+        </p:blipFill>
+        <p:spPr>
+          <a:xfrm>
+            <a:off x="8815713" y="532460"/>
+            <a:ext cx="1003853" cy="2418774"/>
+          </a:xfrm>
+          <a:prstGeom prst="rect">
+            <a:avLst/>
+          </a:prstGeom>
+        </p:spPr>
+      </p:pic>
+      <p:pic>
+        <p:nvPicPr>
+          <p:cNvPr id="4" name="Grafikk 17">
+            <a:extLst>
+              <a:ext uri="{FF2B5EF4-FFF2-40B4-BE49-F238E27FC236}">
+                <a16:creationId xmlns:a16="http://schemas.microsoft.com/office/drawing/2014/main" id="{CD1FE16D-46D2-A39F-846E-B0535EA11E06}"/>
+              </a:ext>
+            </a:extLst>
+          </p:cNvPr>
+          <p:cNvPicPr>
+            <a:picLocks noChangeAspect="1"/>
+          </p:cNvPicPr>
+          <p:nvPr/>
+        </p:nvPicPr>
+        <p:blipFill rotWithShape="1">
+          <a:blip r:embed="rId4">
+            <a:extLst>
+              <a:ext uri="{96DAC541-7B7A-43D3-8B79-37D633B846F1}">
+                <asvg:svgBlip xmlns:asvg="http://schemas.microsoft.com/office/drawing/2016/SVG/main" r:embed="rId5"/>
+              </a:ext>
+            </a:extLst>
+          </a:blip>
+          <a:srcRect l="21012" t="-1" r="49514" b="-7242"/>
+          <a:stretch/>
+        </p:blipFill>
+        <p:spPr>
+          <a:xfrm>
+            <a:off x="11904151" y="579310"/>
+            <a:ext cx="1003853" cy="2418774"/>
+          </a:xfrm>
+          <a:prstGeom prst="rect">
+            <a:avLst/>
+          </a:prstGeom>
+        </p:spPr>
+      </p:pic>
     </p:spTree>
     <p:extLst>
       <p:ext uri="{BB962C8B-B14F-4D97-AF65-F5344CB8AC3E}">
@@ -7763,245 +7695,427 @@
           </a:p>
         </p:txBody>
       </p:sp>
-      <p:sp>
-        <p:nvSpPr>
-          <p:cNvPr id="8" name="Plassholder for innhold 2">
-            <a:extLst>
-              <a:ext uri="{FF2B5EF4-FFF2-40B4-BE49-F238E27FC236}">
-                <a16:creationId xmlns:a16="http://schemas.microsoft.com/office/drawing/2014/main" id="{26163FD1-664A-D64B-8424-FEAC9A3D18AB}"/>
-              </a:ext>
-            </a:extLst>
-          </p:cNvPr>
-          <p:cNvSpPr txBox="1">
-            <a:spLocks/>
-          </p:cNvSpPr>
-          <p:nvPr/>
-        </p:nvSpPr>
-        <p:spPr>
-          <a:xfrm>
-            <a:off x="838201" y="1825625"/>
-            <a:ext cx="4797285" cy="4351338"/>
-          </a:xfrm>
-          <a:prstGeom prst="roundRect">
-            <a:avLst>
-              <a:gd name="adj" fmla="val 6370"/>
-            </a:avLst>
-          </a:prstGeom>
-          <a:solidFill>
-            <a:schemeClr val="bg1"/>
-          </a:solidFill>
-        </p:spPr>
-        <p:txBody>
-          <a:bodyPr vert="horz" lIns="91440" tIns="45720" rIns="91440" bIns="45720" rtlCol="0">
-            <a:normAutofit/>
-          </a:bodyPr>
-          <a:lstStyle>
-            <a:lvl1pPr marL="228600" indent="-228600" algn="l" defTabSz="914400" rtl="0" eaLnBrk="1" latinLnBrk="0" hangingPunct="1">
-              <a:lnSpc>
-                <a:spcPct val="90000"/>
-              </a:lnSpc>
-              <a:spcBef>
-                <a:spcPts val="1000"/>
-              </a:spcBef>
-              <a:buFont typeface="Arial" panose="020B0604020202020204" pitchFamily="34" charset="0"/>
-              <a:buChar char="•"/>
-              <a:defRPr sz="2800" kern="1200">
-                <a:solidFill>
-                  <a:schemeClr val="tx1"/>
-                </a:solidFill>
-                <a:latin typeface="+mn-lt"/>
-                <a:ea typeface="+mn-ea"/>
-                <a:cs typeface="+mn-cs"/>
-              </a:defRPr>
-            </a:lvl1pPr>
-            <a:lvl2pPr marL="685800" indent="-228600" algn="l" defTabSz="914400" rtl="0" eaLnBrk="1" latinLnBrk="0" hangingPunct="1">
-              <a:lnSpc>
-                <a:spcPct val="90000"/>
-              </a:lnSpc>
-              <a:spcBef>
-                <a:spcPts val="500"/>
-              </a:spcBef>
-              <a:buFont typeface="Arial" panose="020B0604020202020204" pitchFamily="34" charset="0"/>
-              <a:buChar char="•"/>
-              <a:defRPr sz="2400" kern="1200">
-                <a:solidFill>
-                  <a:schemeClr val="tx1"/>
-                </a:solidFill>
-                <a:latin typeface="+mn-lt"/>
-                <a:ea typeface="+mn-ea"/>
-                <a:cs typeface="+mn-cs"/>
-              </a:defRPr>
-            </a:lvl2pPr>
-            <a:lvl3pPr marL="1143000" indent="-228600" algn="l" defTabSz="914400" rtl="0" eaLnBrk="1" latinLnBrk="0" hangingPunct="1">
-              <a:lnSpc>
-                <a:spcPct val="90000"/>
-              </a:lnSpc>
-              <a:spcBef>
-                <a:spcPts val="500"/>
-              </a:spcBef>
-              <a:buFont typeface="Arial" panose="020B0604020202020204" pitchFamily="34" charset="0"/>
-              <a:buChar char="•"/>
-              <a:defRPr sz="2000" kern="1200">
-                <a:solidFill>
-                  <a:schemeClr val="tx1"/>
-                </a:solidFill>
-                <a:latin typeface="+mn-lt"/>
-                <a:ea typeface="+mn-ea"/>
-                <a:cs typeface="+mn-cs"/>
-              </a:defRPr>
-            </a:lvl3pPr>
-            <a:lvl4pPr marL="1600200" indent="-228600" algn="l" defTabSz="914400" rtl="0" eaLnBrk="1" latinLnBrk="0" hangingPunct="1">
-              <a:lnSpc>
-                <a:spcPct val="90000"/>
-              </a:lnSpc>
-              <a:spcBef>
-                <a:spcPts val="500"/>
-              </a:spcBef>
-              <a:buFont typeface="Arial" panose="020B0604020202020204" pitchFamily="34" charset="0"/>
-              <a:buChar char="•"/>
-              <a:defRPr sz="1800" kern="1200">
-                <a:solidFill>
-                  <a:schemeClr val="tx1"/>
-                </a:solidFill>
-                <a:latin typeface="+mn-lt"/>
-                <a:ea typeface="+mn-ea"/>
-                <a:cs typeface="+mn-cs"/>
-              </a:defRPr>
-            </a:lvl4pPr>
-            <a:lvl5pPr marL="2057400" indent="-228600" algn="l" defTabSz="914400" rtl="0" eaLnBrk="1" latinLnBrk="0" hangingPunct="1">
-              <a:lnSpc>
-                <a:spcPct val="90000"/>
-              </a:lnSpc>
-              <a:spcBef>
-                <a:spcPts val="500"/>
-              </a:spcBef>
-              <a:buFont typeface="Arial" panose="020B0604020202020204" pitchFamily="34" charset="0"/>
-              <a:buChar char="•"/>
-              <a:defRPr sz="1800" kern="1200">
-                <a:solidFill>
-                  <a:schemeClr val="tx1"/>
-                </a:solidFill>
-                <a:latin typeface="+mn-lt"/>
-                <a:ea typeface="+mn-ea"/>
-                <a:cs typeface="+mn-cs"/>
-              </a:defRPr>
-            </a:lvl5pPr>
-            <a:lvl6pPr marL="2514600" indent="-228600" algn="l" defTabSz="914400" rtl="0" eaLnBrk="1" latinLnBrk="0" hangingPunct="1">
-              <a:lnSpc>
-                <a:spcPct val="90000"/>
-              </a:lnSpc>
-              <a:spcBef>
-                <a:spcPts val="500"/>
-              </a:spcBef>
-              <a:buFont typeface="Arial" panose="020B0604020202020204" pitchFamily="34" charset="0"/>
-              <a:buChar char="•"/>
-              <a:defRPr sz="1800" kern="1200">
-                <a:solidFill>
-                  <a:schemeClr val="tx1"/>
-                </a:solidFill>
-                <a:latin typeface="+mn-lt"/>
-                <a:ea typeface="+mn-ea"/>
-                <a:cs typeface="+mn-cs"/>
-              </a:defRPr>
-            </a:lvl6pPr>
-            <a:lvl7pPr marL="2971800" indent="-228600" algn="l" defTabSz="914400" rtl="0" eaLnBrk="1" latinLnBrk="0" hangingPunct="1">
-              <a:lnSpc>
-                <a:spcPct val="90000"/>
-              </a:lnSpc>
-              <a:spcBef>
-                <a:spcPts val="500"/>
-              </a:spcBef>
-              <a:buFont typeface="Arial" panose="020B0604020202020204" pitchFamily="34" charset="0"/>
-              <a:buChar char="•"/>
-              <a:defRPr sz="1800" kern="1200">
-                <a:solidFill>
-                  <a:schemeClr val="tx1"/>
-                </a:solidFill>
-                <a:latin typeface="+mn-lt"/>
-                <a:ea typeface="+mn-ea"/>
-                <a:cs typeface="+mn-cs"/>
-              </a:defRPr>
-            </a:lvl7pPr>
-            <a:lvl8pPr marL="3429000" indent="-228600" algn="l" defTabSz="914400" rtl="0" eaLnBrk="1" latinLnBrk="0" hangingPunct="1">
-              <a:lnSpc>
-                <a:spcPct val="90000"/>
-              </a:lnSpc>
-              <a:spcBef>
-                <a:spcPts val="500"/>
-              </a:spcBef>
-              <a:buFont typeface="Arial" panose="020B0604020202020204" pitchFamily="34" charset="0"/>
-              <a:buChar char="•"/>
-              <a:defRPr sz="1800" kern="1200">
-                <a:solidFill>
-                  <a:schemeClr val="tx1"/>
-                </a:solidFill>
-                <a:latin typeface="+mn-lt"/>
-                <a:ea typeface="+mn-ea"/>
-                <a:cs typeface="+mn-cs"/>
-              </a:defRPr>
-            </a:lvl8pPr>
-            <a:lvl9pPr marL="3886200" indent="-228600" algn="l" defTabSz="914400" rtl="0" eaLnBrk="1" latinLnBrk="0" hangingPunct="1">
-              <a:lnSpc>
-                <a:spcPct val="90000"/>
-              </a:lnSpc>
-              <a:spcBef>
-                <a:spcPts val="500"/>
-              </a:spcBef>
-              <a:buFont typeface="Arial" panose="020B0604020202020204" pitchFamily="34" charset="0"/>
-              <a:buChar char="•"/>
-              <a:defRPr sz="1800" kern="1200">
-                <a:solidFill>
-                  <a:schemeClr val="tx1"/>
-                </a:solidFill>
-                <a:latin typeface="+mn-lt"/>
-                <a:ea typeface="+mn-ea"/>
-                <a:cs typeface="+mn-cs"/>
-              </a:defRPr>
-            </a:lvl9pPr>
-          </a:lstStyle>
-          <a:p>
-            <a:pPr marL="0" indent="0">
-              <a:buFont typeface="Arial" panose="020B0604020202020204" pitchFamily="34" charset="0"/>
-              <a:buNone/>
-            </a:pPr>
-            <a:r>
-              <a:rPr lang="nb-NO" dirty="0" err="1">
-                <a:latin typeface="Inter Soft Semibold" pitchFamily="2" charset="0"/>
-                <a:ea typeface="Inter Soft Semibold" pitchFamily="2" charset="0"/>
-              </a:rPr>
-              <a:t>Analytical</a:t>
-            </a:r>
-            <a:r>
-              <a:rPr lang="nb-NO" dirty="0">
-                <a:latin typeface="Inter Soft Semibold" pitchFamily="2" charset="0"/>
-                <a:ea typeface="Inter Soft Semibold" pitchFamily="2" charset="0"/>
-              </a:rPr>
-              <a:t> </a:t>
-            </a:r>
-            <a:r>
-              <a:rPr lang="nb-NO" dirty="0" err="1">
-                <a:latin typeface="Inter Soft Semibold" pitchFamily="2" charset="0"/>
-                <a:ea typeface="Inter Soft Semibold" pitchFamily="2" charset="0"/>
-              </a:rPr>
-              <a:t>solution</a:t>
-            </a:r>
-            <a:endParaRPr lang="nb-NO" dirty="0">
-              <a:latin typeface="Inter Soft Semibold" pitchFamily="2" charset="0"/>
-              <a:ea typeface="Inter Soft Semibold" pitchFamily="2" charset="0"/>
-            </a:endParaRPr>
-          </a:p>
-          <a:p>
-            <a:pPr marL="0" indent="0">
-              <a:buFont typeface="Arial" panose="020B0604020202020204" pitchFamily="34" charset="0"/>
-              <a:buNone/>
-            </a:pPr>
-            <a:endParaRPr lang="nb-NO" dirty="0">
-              <a:latin typeface="Inter Soft Semibold" pitchFamily="2" charset="0"/>
-              <a:ea typeface="Inter Soft Semibold" pitchFamily="2" charset="0"/>
-            </a:endParaRPr>
-          </a:p>
-        </p:txBody>
-      </p:sp>
+      <mc:AlternateContent xmlns:mc="http://schemas.openxmlformats.org/markup-compatibility/2006">
+        <mc:Choice xmlns:a14="http://schemas.microsoft.com/office/drawing/2010/main" Requires="a14">
+          <p:sp>
+            <p:nvSpPr>
+              <p:cNvPr id="8" name="Plassholder for innhold 2">
+                <a:extLst>
+                  <a:ext uri="{FF2B5EF4-FFF2-40B4-BE49-F238E27FC236}">
+                    <a16:creationId xmlns:a16="http://schemas.microsoft.com/office/drawing/2014/main" id="{26163FD1-664A-D64B-8424-FEAC9A3D18AB}"/>
+                  </a:ext>
+                </a:extLst>
+              </p:cNvPr>
+              <p:cNvSpPr txBox="1">
+                <a:spLocks/>
+              </p:cNvSpPr>
+              <p:nvPr/>
+            </p:nvSpPr>
+            <p:spPr>
+              <a:xfrm>
+                <a:off x="838201" y="1825625"/>
+                <a:ext cx="4797285" cy="4351338"/>
+              </a:xfrm>
+              <a:prstGeom prst="roundRect">
+                <a:avLst>
+                  <a:gd name="adj" fmla="val 6370"/>
+                </a:avLst>
+              </a:prstGeom>
+              <a:solidFill>
+                <a:schemeClr val="bg1"/>
+              </a:solidFill>
+            </p:spPr>
+            <p:txBody>
+              <a:bodyPr vert="horz" lIns="91440" tIns="45720" rIns="91440" bIns="45720" rtlCol="0">
+                <a:normAutofit/>
+              </a:bodyPr>
+              <a:lstStyle>
+                <a:lvl1pPr marL="228600" indent="-228600" algn="l" defTabSz="914400" rtl="0" eaLnBrk="1" latinLnBrk="0" hangingPunct="1">
+                  <a:lnSpc>
+                    <a:spcPct val="90000"/>
+                  </a:lnSpc>
+                  <a:spcBef>
+                    <a:spcPts val="1000"/>
+                  </a:spcBef>
+                  <a:buFont typeface="Arial" panose="020B0604020202020204" pitchFamily="34" charset="0"/>
+                  <a:buChar char="•"/>
+                  <a:defRPr sz="2800" kern="1200">
+                    <a:solidFill>
+                      <a:schemeClr val="tx1"/>
+                    </a:solidFill>
+                    <a:latin typeface="+mn-lt"/>
+                    <a:ea typeface="+mn-ea"/>
+                    <a:cs typeface="+mn-cs"/>
+                  </a:defRPr>
+                </a:lvl1pPr>
+                <a:lvl2pPr marL="685800" indent="-228600" algn="l" defTabSz="914400" rtl="0" eaLnBrk="1" latinLnBrk="0" hangingPunct="1">
+                  <a:lnSpc>
+                    <a:spcPct val="90000"/>
+                  </a:lnSpc>
+                  <a:spcBef>
+                    <a:spcPts val="500"/>
+                  </a:spcBef>
+                  <a:buFont typeface="Arial" panose="020B0604020202020204" pitchFamily="34" charset="0"/>
+                  <a:buChar char="•"/>
+                  <a:defRPr sz="2400" kern="1200">
+                    <a:solidFill>
+                      <a:schemeClr val="tx1"/>
+                    </a:solidFill>
+                    <a:latin typeface="+mn-lt"/>
+                    <a:ea typeface="+mn-ea"/>
+                    <a:cs typeface="+mn-cs"/>
+                  </a:defRPr>
+                </a:lvl2pPr>
+                <a:lvl3pPr marL="1143000" indent="-228600" algn="l" defTabSz="914400" rtl="0" eaLnBrk="1" latinLnBrk="0" hangingPunct="1">
+                  <a:lnSpc>
+                    <a:spcPct val="90000"/>
+                  </a:lnSpc>
+                  <a:spcBef>
+                    <a:spcPts val="500"/>
+                  </a:spcBef>
+                  <a:buFont typeface="Arial" panose="020B0604020202020204" pitchFamily="34" charset="0"/>
+                  <a:buChar char="•"/>
+                  <a:defRPr sz="2000" kern="1200">
+                    <a:solidFill>
+                      <a:schemeClr val="tx1"/>
+                    </a:solidFill>
+                    <a:latin typeface="+mn-lt"/>
+                    <a:ea typeface="+mn-ea"/>
+                    <a:cs typeface="+mn-cs"/>
+                  </a:defRPr>
+                </a:lvl3pPr>
+                <a:lvl4pPr marL="1600200" indent="-228600" algn="l" defTabSz="914400" rtl="0" eaLnBrk="1" latinLnBrk="0" hangingPunct="1">
+                  <a:lnSpc>
+                    <a:spcPct val="90000"/>
+                  </a:lnSpc>
+                  <a:spcBef>
+                    <a:spcPts val="500"/>
+                  </a:spcBef>
+                  <a:buFont typeface="Arial" panose="020B0604020202020204" pitchFamily="34" charset="0"/>
+                  <a:buChar char="•"/>
+                  <a:defRPr sz="1800" kern="1200">
+                    <a:solidFill>
+                      <a:schemeClr val="tx1"/>
+                    </a:solidFill>
+                    <a:latin typeface="+mn-lt"/>
+                    <a:ea typeface="+mn-ea"/>
+                    <a:cs typeface="+mn-cs"/>
+                  </a:defRPr>
+                </a:lvl4pPr>
+                <a:lvl5pPr marL="2057400" indent="-228600" algn="l" defTabSz="914400" rtl="0" eaLnBrk="1" latinLnBrk="0" hangingPunct="1">
+                  <a:lnSpc>
+                    <a:spcPct val="90000"/>
+                  </a:lnSpc>
+                  <a:spcBef>
+                    <a:spcPts val="500"/>
+                  </a:spcBef>
+                  <a:buFont typeface="Arial" panose="020B0604020202020204" pitchFamily="34" charset="0"/>
+                  <a:buChar char="•"/>
+                  <a:defRPr sz="1800" kern="1200">
+                    <a:solidFill>
+                      <a:schemeClr val="tx1"/>
+                    </a:solidFill>
+                    <a:latin typeface="+mn-lt"/>
+                    <a:ea typeface="+mn-ea"/>
+                    <a:cs typeface="+mn-cs"/>
+                  </a:defRPr>
+                </a:lvl5pPr>
+                <a:lvl6pPr marL="2514600" indent="-228600" algn="l" defTabSz="914400" rtl="0" eaLnBrk="1" latinLnBrk="0" hangingPunct="1">
+                  <a:lnSpc>
+                    <a:spcPct val="90000"/>
+                  </a:lnSpc>
+                  <a:spcBef>
+                    <a:spcPts val="500"/>
+                  </a:spcBef>
+                  <a:buFont typeface="Arial" panose="020B0604020202020204" pitchFamily="34" charset="0"/>
+                  <a:buChar char="•"/>
+                  <a:defRPr sz="1800" kern="1200">
+                    <a:solidFill>
+                      <a:schemeClr val="tx1"/>
+                    </a:solidFill>
+                    <a:latin typeface="+mn-lt"/>
+                    <a:ea typeface="+mn-ea"/>
+                    <a:cs typeface="+mn-cs"/>
+                  </a:defRPr>
+                </a:lvl6pPr>
+                <a:lvl7pPr marL="2971800" indent="-228600" algn="l" defTabSz="914400" rtl="0" eaLnBrk="1" latinLnBrk="0" hangingPunct="1">
+                  <a:lnSpc>
+                    <a:spcPct val="90000"/>
+                  </a:lnSpc>
+                  <a:spcBef>
+                    <a:spcPts val="500"/>
+                  </a:spcBef>
+                  <a:buFont typeface="Arial" panose="020B0604020202020204" pitchFamily="34" charset="0"/>
+                  <a:buChar char="•"/>
+                  <a:defRPr sz="1800" kern="1200">
+                    <a:solidFill>
+                      <a:schemeClr val="tx1"/>
+                    </a:solidFill>
+                    <a:latin typeface="+mn-lt"/>
+                    <a:ea typeface="+mn-ea"/>
+                    <a:cs typeface="+mn-cs"/>
+                  </a:defRPr>
+                </a:lvl7pPr>
+                <a:lvl8pPr marL="3429000" indent="-228600" algn="l" defTabSz="914400" rtl="0" eaLnBrk="1" latinLnBrk="0" hangingPunct="1">
+                  <a:lnSpc>
+                    <a:spcPct val="90000"/>
+                  </a:lnSpc>
+                  <a:spcBef>
+                    <a:spcPts val="500"/>
+                  </a:spcBef>
+                  <a:buFont typeface="Arial" panose="020B0604020202020204" pitchFamily="34" charset="0"/>
+                  <a:buChar char="•"/>
+                  <a:defRPr sz="1800" kern="1200">
+                    <a:solidFill>
+                      <a:schemeClr val="tx1"/>
+                    </a:solidFill>
+                    <a:latin typeface="+mn-lt"/>
+                    <a:ea typeface="+mn-ea"/>
+                    <a:cs typeface="+mn-cs"/>
+                  </a:defRPr>
+                </a:lvl8pPr>
+                <a:lvl9pPr marL="3886200" indent="-228600" algn="l" defTabSz="914400" rtl="0" eaLnBrk="1" latinLnBrk="0" hangingPunct="1">
+                  <a:lnSpc>
+                    <a:spcPct val="90000"/>
+                  </a:lnSpc>
+                  <a:spcBef>
+                    <a:spcPts val="500"/>
+                  </a:spcBef>
+                  <a:buFont typeface="Arial" panose="020B0604020202020204" pitchFamily="34" charset="0"/>
+                  <a:buChar char="•"/>
+                  <a:defRPr sz="1800" kern="1200">
+                    <a:solidFill>
+                      <a:schemeClr val="tx1"/>
+                    </a:solidFill>
+                    <a:latin typeface="+mn-lt"/>
+                    <a:ea typeface="+mn-ea"/>
+                    <a:cs typeface="+mn-cs"/>
+                  </a:defRPr>
+                </a:lvl9pPr>
+              </a:lstStyle>
+              <a:p>
+                <a:pPr marL="0" indent="0">
+                  <a:buFont typeface="Arial" panose="020B0604020202020204" pitchFamily="34" charset="0"/>
+                  <a:buNone/>
+                </a:pPr>
+                <a:r>
+                  <a:rPr lang="nb-NO" strike="sngStrike" dirty="0">
+                    <a:latin typeface="Inter Soft Semibold" pitchFamily="2" charset="0"/>
+                    <a:ea typeface="Inter Soft Semibold" pitchFamily="2" charset="0"/>
+                  </a:rPr>
+                  <a:t>Analytical</a:t>
+                </a:r>
+                <a:r>
+                  <a:rPr lang="nb-NO" dirty="0">
+                    <a:latin typeface="Inter Soft Semibold" pitchFamily="2" charset="0"/>
+                    <a:ea typeface="Inter Soft Semibold" pitchFamily="2" charset="0"/>
+                  </a:rPr>
+                  <a:t> Numerical solution</a:t>
+                </a:r>
+              </a:p>
+              <a:p>
+                <a:pPr marL="0" indent="0">
+                  <a:buFont typeface="Arial" panose="020B0604020202020204" pitchFamily="34" charset="0"/>
+                  <a:buNone/>
+                </a:pPr>
+                <a:endParaRPr lang="nb-NO" dirty="0">
+                  <a:latin typeface="Inter Soft Semibold" pitchFamily="2" charset="0"/>
+                  <a:ea typeface="Inter Soft Semibold" pitchFamily="2" charset="0"/>
+                </a:endParaRPr>
+              </a:p>
+              <a:p>
+                <a:pPr marL="0" indent="0">
+                  <a:buFont typeface="Arial" panose="020B0604020202020204" pitchFamily="34" charset="0"/>
+                  <a:buNone/>
+                </a:pPr>
+                <a:r>
+                  <a:rPr lang="nb-NO" dirty="0">
+                    <a:latin typeface="Inter Soft Semibold" pitchFamily="2" charset="0"/>
+                    <a:ea typeface="Inter Soft Semibold" pitchFamily="2" charset="0"/>
+                  </a:rPr>
+                  <a:t>Navier’s solution</a:t>
+                </a:r>
+              </a:p>
+              <a:p>
+                <a:pPr marL="0" indent="0">
+                  <a:buNone/>
+                </a:pPr>
+                <a14:m>
+                  <m:oMathPara xmlns:m="http://schemas.openxmlformats.org/officeDocument/2006/math">
+                    <m:oMathParaPr>
+                      <m:jc m:val="centerGroup"/>
+                    </m:oMathParaPr>
+                    <m:oMath xmlns:m="http://schemas.openxmlformats.org/officeDocument/2006/math">
+                      <m:sSup>
+                        <m:sSupPr>
+                          <m:ctrlPr>
+                            <a:rPr lang="pt-BR" i="1" smtClean="0">
+                              <a:latin typeface="Cambria Math" panose="02040503050406030204" pitchFamily="18" charset="0"/>
+                              <a:ea typeface="Inter Soft Semibold" pitchFamily="2" charset="0"/>
+                            </a:rPr>
+                          </m:ctrlPr>
+                        </m:sSupPr>
+                        <m:e>
+                          <m:r>
+                            <a:rPr lang="nb-NO" b="0" i="1" smtClean="0">
+                              <a:latin typeface="Cambria Math" panose="02040503050406030204" pitchFamily="18" charset="0"/>
+                              <a:ea typeface="Inter Soft Semibold" pitchFamily="2" charset="0"/>
+                            </a:rPr>
+                            <m:t>𝑤</m:t>
+                          </m:r>
+                          <m:d>
+                            <m:dPr>
+                              <m:ctrlPr>
+                                <a:rPr lang="pt-BR" i="1" smtClean="0">
+                                  <a:latin typeface="Cambria Math" panose="02040503050406030204" pitchFamily="18" charset="0"/>
+                                  <a:ea typeface="Inter Soft Semibold" pitchFamily="2" charset="0"/>
+                                </a:rPr>
+                              </m:ctrlPr>
+                            </m:dPr>
+                            <m:e>
+                              <m:r>
+                                <a:rPr lang="nb-NO" b="0" i="1" smtClean="0">
+                                  <a:latin typeface="Cambria Math" panose="02040503050406030204" pitchFamily="18" charset="0"/>
+                                  <a:ea typeface="Inter Soft Semibold" pitchFamily="2" charset="0"/>
+                                </a:rPr>
+                                <m:t>𝑥</m:t>
+                              </m:r>
+                              <m:r>
+                                <a:rPr lang="nb-NO" b="0" i="1" smtClean="0">
+                                  <a:latin typeface="Cambria Math" panose="02040503050406030204" pitchFamily="18" charset="0"/>
+                                  <a:ea typeface="Inter Soft Semibold" pitchFamily="2" charset="0"/>
+                                </a:rPr>
+                                <m:t>, </m:t>
+                              </m:r>
+                              <m:r>
+                                <a:rPr lang="nb-NO" b="0" i="1" smtClean="0">
+                                  <a:latin typeface="Cambria Math" panose="02040503050406030204" pitchFamily="18" charset="0"/>
+                                  <a:ea typeface="Inter Soft Semibold" pitchFamily="2" charset="0"/>
+                                </a:rPr>
+                                <m:t>𝑦</m:t>
+                              </m:r>
+                            </m:e>
+                          </m:d>
+                        </m:e>
+                        <m:sup/>
+                      </m:sSup>
+                      <m:r>
+                        <a:rPr lang="pt-BR" i="1" smtClean="0">
+                          <a:latin typeface="Cambria Math" panose="02040503050406030204" pitchFamily="18" charset="0"/>
+                          <a:ea typeface="Inter Soft Semibold" pitchFamily="2" charset="0"/>
+                        </a:rPr>
+                        <m:t>=</m:t>
+                      </m:r>
+                      <m:nary>
+                        <m:naryPr>
+                          <m:chr m:val="∑"/>
+                          <m:ctrlPr>
+                            <a:rPr lang="pt-BR" i="1" smtClean="0">
+                              <a:latin typeface="Cambria Math" panose="02040503050406030204" pitchFamily="18" charset="0"/>
+                              <a:ea typeface="Inter Soft Semibold" pitchFamily="2" charset="0"/>
+                            </a:rPr>
+                          </m:ctrlPr>
+                        </m:naryPr>
+                        <m:sub>
+                          <m:r>
+                            <a:rPr lang="nb-NO" i="1">
+                              <a:latin typeface="Cambria Math" panose="02040503050406030204" pitchFamily="18" charset="0"/>
+                              <a:ea typeface="Inter Soft Semibold" pitchFamily="2" charset="0"/>
+                            </a:rPr>
+                            <m:t>𝑚</m:t>
+                          </m:r>
+                          <m:r>
+                            <a:rPr lang="pt-BR" i="1">
+                              <a:latin typeface="Cambria Math" panose="02040503050406030204" pitchFamily="18" charset="0"/>
+                              <a:ea typeface="Inter Soft Semibold" pitchFamily="2" charset="0"/>
+                            </a:rPr>
+                            <m:t>=</m:t>
+                          </m:r>
+                          <m:r>
+                            <a:rPr lang="nb-NO" i="1">
+                              <a:latin typeface="Cambria Math" panose="02040503050406030204" pitchFamily="18" charset="0"/>
+                              <a:ea typeface="Inter Soft Semibold" pitchFamily="2" charset="0"/>
+                            </a:rPr>
+                            <m:t>1</m:t>
+                          </m:r>
+                        </m:sub>
+                        <m:sup>
+                          <m:r>
+                            <a:rPr lang="nb-NO" i="1">
+                              <a:latin typeface="Cambria Math" panose="02040503050406030204" pitchFamily="18" charset="0"/>
+                              <a:ea typeface="Inter Soft Semibold" pitchFamily="2" charset="0"/>
+                            </a:rPr>
+                            <m:t>𝑀</m:t>
+                          </m:r>
+                        </m:sup>
+                        <m:e>
+                          <m:r>
+                            <a:rPr lang="nb-NO" b="0" i="1" smtClean="0">
+                              <a:latin typeface="Cambria Math" panose="02040503050406030204" pitchFamily="18" charset="0"/>
+                              <a:ea typeface="Inter Soft Semibold" pitchFamily="2" charset="0"/>
+                            </a:rPr>
+                            <m:t>𝑤</m:t>
+                          </m:r>
+                        </m:e>
+                      </m:nary>
+                    </m:oMath>
+                  </m:oMathPara>
+                </a14:m>
+                <a:endParaRPr lang="nb-NO" dirty="0">
+                  <a:latin typeface="Inter Soft Semibold" pitchFamily="2" charset="0"/>
+                  <a:ea typeface="Inter Soft Semibold" pitchFamily="2" charset="0"/>
+                </a:endParaRPr>
+              </a:p>
+            </p:txBody>
+          </p:sp>
+        </mc:Choice>
+        <mc:Fallback>
+          <p:sp>
+            <p:nvSpPr>
+              <p:cNvPr id="8" name="Plassholder for innhold 2">
+                <a:extLst>
+                  <a:ext uri="{FF2B5EF4-FFF2-40B4-BE49-F238E27FC236}">
+                    <a16:creationId xmlns:a16="http://schemas.microsoft.com/office/drawing/2014/main" id="{26163FD1-664A-D64B-8424-FEAC9A3D18AB}"/>
+                  </a:ext>
+                </a:extLst>
+              </p:cNvPr>
+              <p:cNvSpPr txBox="1">
+                <a:spLocks noRot="1" noChangeAspect="1" noMove="1" noResize="1" noEditPoints="1" noAdjustHandles="1" noChangeArrowheads="1" noChangeShapeType="1" noTextEdit="1"/>
+              </p:cNvSpPr>
+              <p:nvPr/>
+            </p:nvSpPr>
+            <p:spPr>
+              <a:xfrm>
+                <a:off x="838201" y="1825625"/>
+                <a:ext cx="4797285" cy="4351338"/>
+              </a:xfrm>
+              <a:prstGeom prst="roundRect">
+                <a:avLst>
+                  <a:gd name="adj" fmla="val 6370"/>
+                </a:avLst>
+              </a:prstGeom>
+              <a:blipFill>
+                <a:blip r:embed="rId2"/>
+                <a:stretch>
+                  <a:fillRect l="-1018" t="-420"/>
+                </a:stretch>
+              </a:blipFill>
+            </p:spPr>
+            <p:txBody>
+              <a:bodyPr/>
+              <a:lstStyle/>
+              <a:p>
+                <a:r>
+                  <a:rPr lang="nb-NO">
+                    <a:noFill/>
+                  </a:rPr>
+                  <a:t> </a:t>
+                </a:r>
+              </a:p>
+            </p:txBody>
+          </p:sp>
+        </mc:Fallback>
+      </mc:AlternateContent>
       <p:sp>
         <p:nvSpPr>
           <p:cNvPr id="10" name="Plassholder for innhold 2">

</xml_diff>

<commit_message>
with or without feets
</commit_message>
<xml_diff>
--- a/presentation/elementMethod_EXAM_PP.pptx
+++ b/presentation/elementMethod_EXAM_PP.pptx
@@ -267,7 +267,7 @@
           <a:p>
             <a:fld id="{F4CD86A1-9B72-4040-9535-F1A9B0053CB3}" type="datetimeFigureOut">
               <a:rPr lang="nb-NO" smtClean="0"/>
-              <a:t>21.02.2024</a:t>
+              <a:t>22.02.2024</a:t>
             </a:fld>
             <a:endParaRPr lang="nb-NO" dirty="0"/>
           </a:p>
@@ -465,7 +465,7 @@
           <a:p>
             <a:fld id="{F4CD86A1-9B72-4040-9535-F1A9B0053CB3}" type="datetimeFigureOut">
               <a:rPr lang="nb-NO" smtClean="0"/>
-              <a:t>21.02.2024</a:t>
+              <a:t>22.02.2024</a:t>
             </a:fld>
             <a:endParaRPr lang="nb-NO"/>
           </a:p>
@@ -673,7 +673,7 @@
           <a:p>
             <a:fld id="{F4CD86A1-9B72-4040-9535-F1A9B0053CB3}" type="datetimeFigureOut">
               <a:rPr lang="nb-NO" smtClean="0"/>
-              <a:t>21.02.2024</a:t>
+              <a:t>22.02.2024</a:t>
             </a:fld>
             <a:endParaRPr lang="nb-NO"/>
           </a:p>
@@ -871,7 +871,7 @@
           <a:p>
             <a:fld id="{F4CD86A1-9B72-4040-9535-F1A9B0053CB3}" type="datetimeFigureOut">
               <a:rPr lang="nb-NO" smtClean="0"/>
-              <a:t>21.02.2024</a:t>
+              <a:t>22.02.2024</a:t>
             </a:fld>
             <a:endParaRPr lang="nb-NO"/>
           </a:p>
@@ -1146,7 +1146,7 @@
           <a:p>
             <a:fld id="{F4CD86A1-9B72-4040-9535-F1A9B0053CB3}" type="datetimeFigureOut">
               <a:rPr lang="nb-NO" smtClean="0"/>
-              <a:t>21.02.2024</a:t>
+              <a:t>22.02.2024</a:t>
             </a:fld>
             <a:endParaRPr lang="nb-NO"/>
           </a:p>
@@ -1411,7 +1411,7 @@
           <a:p>
             <a:fld id="{F4CD86A1-9B72-4040-9535-F1A9B0053CB3}" type="datetimeFigureOut">
               <a:rPr lang="nb-NO" smtClean="0"/>
-              <a:t>21.02.2024</a:t>
+              <a:t>22.02.2024</a:t>
             </a:fld>
             <a:endParaRPr lang="nb-NO"/>
           </a:p>
@@ -1823,7 +1823,7 @@
           <a:p>
             <a:fld id="{F4CD86A1-9B72-4040-9535-F1A9B0053CB3}" type="datetimeFigureOut">
               <a:rPr lang="nb-NO" smtClean="0"/>
-              <a:t>21.02.2024</a:t>
+              <a:t>22.02.2024</a:t>
             </a:fld>
             <a:endParaRPr lang="nb-NO"/>
           </a:p>
@@ -1964,7 +1964,7 @@
           <a:p>
             <a:fld id="{F4CD86A1-9B72-4040-9535-F1A9B0053CB3}" type="datetimeFigureOut">
               <a:rPr lang="nb-NO" smtClean="0"/>
-              <a:t>21.02.2024</a:t>
+              <a:t>22.02.2024</a:t>
             </a:fld>
             <a:endParaRPr lang="nb-NO"/>
           </a:p>
@@ -2077,7 +2077,7 @@
           <a:p>
             <a:fld id="{F4CD86A1-9B72-4040-9535-F1A9B0053CB3}" type="datetimeFigureOut">
               <a:rPr lang="nb-NO" smtClean="0"/>
-              <a:t>21.02.2024</a:t>
+              <a:t>22.02.2024</a:t>
             </a:fld>
             <a:endParaRPr lang="nb-NO"/>
           </a:p>
@@ -2388,7 +2388,7 @@
           <a:p>
             <a:fld id="{F4CD86A1-9B72-4040-9535-F1A9B0053CB3}" type="datetimeFigureOut">
               <a:rPr lang="nb-NO" smtClean="0"/>
-              <a:t>21.02.2024</a:t>
+              <a:t>22.02.2024</a:t>
             </a:fld>
             <a:endParaRPr lang="nb-NO"/>
           </a:p>
@@ -2676,7 +2676,7 @@
           <a:p>
             <a:fld id="{F4CD86A1-9B72-4040-9535-F1A9B0053CB3}" type="datetimeFigureOut">
               <a:rPr lang="nb-NO" smtClean="0"/>
-              <a:t>21.02.2024</a:t>
+              <a:t>22.02.2024</a:t>
             </a:fld>
             <a:endParaRPr lang="nb-NO"/>
           </a:p>
@@ -2920,7 +2920,7 @@
           <a:p>
             <a:fld id="{F4CD86A1-9B72-4040-9535-F1A9B0053CB3}" type="datetimeFigureOut">
               <a:rPr lang="nb-NO" smtClean="0"/>
-              <a:t>21.02.2024</a:t>
+              <a:t>22.02.2024</a:t>
             </a:fld>
             <a:endParaRPr lang="nb-NO"/>
           </a:p>
@@ -3879,24 +3879,31 @@
               </a:rPr>
             </a:br>
             <a:r>
-              <a:rPr lang="nb-NO" strike="sngStrike" dirty="0">
+              <a:rPr lang="nb-NO" dirty="0">
                 <a:solidFill>
                   <a:srgbClr val="009C94"/>
                 </a:solidFill>
                 <a:latin typeface="Inter Soft Semibold" pitchFamily="2" charset="0"/>
                 <a:ea typeface="Inter Soft Semibold" pitchFamily="2" charset="0"/>
               </a:rPr>
-              <a:t>plate</a:t>
+              <a:t>plate </a:t>
             </a:r>
             <a:r>
               <a:rPr lang="nb-NO" dirty="0">
-                <a:solidFill>
-                  <a:srgbClr val="009C94"/>
-                </a:solidFill>
                 <a:latin typeface="Inter Soft Semibold" pitchFamily="2" charset="0"/>
                 <a:ea typeface="Inter Soft Semibold" pitchFamily="2" charset="0"/>
               </a:rPr>
-              <a:t> shell of aluminum</a:t>
+              <a:t>of</a:t>
+            </a:r>
+            <a:r>
+              <a:rPr lang="nb-NO" dirty="0">
+                <a:solidFill>
+                  <a:srgbClr val="009C94"/>
+                </a:solidFill>
+                <a:latin typeface="Inter Soft Semibold" pitchFamily="2" charset="0"/>
+                <a:ea typeface="Inter Soft Semibold" pitchFamily="2" charset="0"/>
+              </a:rPr>
+              <a:t> aluminum</a:t>
             </a:r>
             <a:br>
               <a:rPr lang="nb-NO" dirty="0">
@@ -4898,21 +4905,41 @@
                 <a:latin typeface="Inter Soft Semibold" pitchFamily="2" charset="0"/>
                 <a:ea typeface="Inter Soft Semibold" pitchFamily="2" charset="0"/>
               </a:rPr>
-              <a:t>How much force can a </a:t>
-            </a:r>
-            <a:r>
-              <a:rPr lang="nb-NO" strike="sngStrike" dirty="0">
+              <a:t>How much will a </a:t>
+            </a:r>
+            <a:r>
+              <a:rPr lang="nb-NO" dirty="0">
+                <a:solidFill>
+                  <a:srgbClr val="009C94"/>
+                </a:solidFill>
                 <a:latin typeface="Inter Soft Semibold" pitchFamily="2" charset="0"/>
                 <a:ea typeface="Inter Soft Semibold" pitchFamily="2" charset="0"/>
               </a:rPr>
-              <a:t>plate</a:t>
+              <a:t>Macbook Pro</a:t>
             </a:r>
             <a:r>
               <a:rPr lang="nb-NO" dirty="0">
                 <a:latin typeface="Inter Soft Semibold" pitchFamily="2" charset="0"/>
                 <a:ea typeface="Inter Soft Semibold" pitchFamily="2" charset="0"/>
               </a:rPr>
-              <a:t> shell of aluminum withstand?</a:t>
+              <a:t> (made of </a:t>
+            </a:r>
+            <a:r>
+              <a:rPr lang="nb-NO" dirty="0">
+                <a:solidFill>
+                  <a:srgbClr val="009C94"/>
+                </a:solidFill>
+                <a:latin typeface="Inter Soft Semibold" pitchFamily="2" charset="0"/>
+                <a:ea typeface="Inter Soft Semibold" pitchFamily="2" charset="0"/>
+              </a:rPr>
+              <a:t>aluminum</a:t>
+            </a:r>
+            <a:r>
+              <a:rPr lang="nb-NO" dirty="0">
+                <a:latin typeface="Inter Soft Semibold" pitchFamily="2" charset="0"/>
+                <a:ea typeface="Inter Soft Semibold" pitchFamily="2" charset="0"/>
+              </a:rPr>
+              <a:t>) deform?</a:t>
             </a:r>
           </a:p>
           <a:p>
@@ -5475,7 +5502,7 @@
         </p:blipFill>
         <p:spPr>
           <a:xfrm>
-            <a:off x="10199571" y="542180"/>
+            <a:off x="9987167" y="532460"/>
             <a:ext cx="1003853" cy="2418774"/>
           </a:xfrm>
           <a:prstGeom prst="rect">
@@ -7695,8 +7722,8 @@
           </a:p>
         </p:txBody>
       </p:sp>
-      <mc:AlternateContent xmlns:mc="http://schemas.openxmlformats.org/markup-compatibility/2006">
-        <mc:Choice xmlns:a14="http://schemas.microsoft.com/office/drawing/2010/main" Requires="a14">
+      <mc:AlternateContent xmlns:mc="http://schemas.openxmlformats.org/markup-compatibility/2006" xmlns:a14="http://schemas.microsoft.com/office/drawing/2010/main">
+        <mc:Choice Requires="a14">
           <p:sp>
             <p:nvSpPr>
               <p:cNvPr id="8" name="Plassholder for innhold 2">
@@ -8069,7 +8096,7 @@
             </p:txBody>
           </p:sp>
         </mc:Choice>
-        <mc:Fallback>
+        <mc:Fallback xmlns="">
           <p:sp>
             <p:nvSpPr>
               <p:cNvPr id="8" name="Plassholder for innhold 2">

</xml_diff>